<commit_message>
working on ppt and changed spelling in index.html
</commit_message>
<xml_diff>
--- a/BC_Project3_presentation.pptx
+++ b/BC_Project3_presentation.pptx
@@ -5495,7 +5495,7 @@
         </p:spPr>
         <p:txBody>
           <a:bodyPr vert="horz" lIns="91440" tIns="45720" rIns="91440" bIns="45720" rtlCol="0" anchor="ctr">
-            <a:normAutofit fontScale="62500" lnSpcReduction="20000"/>
+            <a:normAutofit fontScale="40000" lnSpcReduction="20000"/>
           </a:bodyPr>
           <a:lstStyle>
             <a:lvl1pPr algn="l" defTabSz="914400" rtl="0" eaLnBrk="1" latinLnBrk="0" hangingPunct="1">
@@ -5531,6 +5531,25 @@
             </a:pPr>
             <a:r>
               <a:rPr lang="en-US" sz="3600" dirty="0"/>
+              <a:t>Hypothesis :</a:t>
+            </a:r>
+          </a:p>
+          <a:p>
+            <a:pPr>
+              <a:lnSpc>
+                <a:spcPct val="170000"/>
+              </a:lnSpc>
+            </a:pPr>
+            <a:endParaRPr lang="en-US" sz="3600" dirty="0"/>
+          </a:p>
+          <a:p>
+            <a:pPr>
+              <a:lnSpc>
+                <a:spcPct val="170000"/>
+              </a:lnSpc>
+            </a:pPr>
+            <a:r>
+              <a:rPr lang="en-US" sz="3600" dirty="0"/>
               <a:t>Steps :</a:t>
             </a:r>
           </a:p>
@@ -5630,13 +5649,49 @@
             </a:pPr>
             <a:r>
               <a:rPr lang="en-US" sz="3600" dirty="0"/>
-              <a:t>Use the coefficients and y-intercept to predict </a:t>
-            </a:r>
-            <a:r>
-              <a:rPr lang="en-US" sz="3600"/>
-              <a:t>future outcomes</a:t>
-            </a:r>
-            <a:endParaRPr lang="en-US" sz="3600" dirty="0"/>
+              <a:t>Use the coefficients and y-intercept to predict future outcomes</a:t>
+            </a:r>
+          </a:p>
+          <a:p>
+            <a:pPr>
+              <a:lnSpc>
+                <a:spcPct val="170000"/>
+              </a:lnSpc>
+            </a:pPr>
+            <a:r>
+              <a:rPr lang="en-US" sz="3600" dirty="0"/>
+              <a:t>Conclusion :</a:t>
+            </a:r>
+          </a:p>
+          <a:p>
+            <a:pPr>
+              <a:lnSpc>
+                <a:spcPct val="170000"/>
+              </a:lnSpc>
+            </a:pPr>
+            <a:r>
+              <a:rPr lang="en-US" sz="3600" dirty="0"/>
+              <a:t>A peek into the future </a:t>
+            </a:r>
+          </a:p>
+          <a:p>
+            <a:pPr>
+              <a:lnSpc>
+                <a:spcPct val="170000"/>
+              </a:lnSpc>
+            </a:pPr>
+            <a:r>
+              <a:rPr lang="en-US" sz="3700" dirty="0"/>
+              <a:t>What if the wages continue to rise at their current rate and the </a:t>
+            </a:r>
+            <a:r>
+              <a:rPr lang="en-US" sz="3700" dirty="0" err="1"/>
+              <a:t>morgage</a:t>
+            </a:r>
+            <a:r>
+              <a:rPr lang="en-US" sz="3700" dirty="0"/>
+              <a:t> rate (30 year fixed) holds steady at 4.6 % ...Can you afford to buy a median price home in the future???</a:t>
+            </a:r>
           </a:p>
           <a:p>
             <a:pPr marL="571500" indent="-571500">
@@ -5811,7 +5866,7 @@
           <p:nvPr>
             <p:extLst>
               <p:ext uri="{D42A27DB-BD31-4B8C-83A1-F6EECF244321}">
-                <p14:modId xmlns:p14="http://schemas.microsoft.com/office/powerpoint/2010/main" val="50866636"/>
+                <p14:modId xmlns:p14="http://schemas.microsoft.com/office/powerpoint/2010/main" val="374647494"/>
               </p:ext>
             </p:extLst>
           </p:nvPr>
@@ -5940,6 +5995,18 @@
                     <a:bodyPr/>
                     <a:lstStyle/>
                     <a:p>
+                      <a:r>
+                        <a:rPr lang="en-US" sz="1400" b="0" i="0" kern="1200" dirty="0">
+                          <a:solidFill>
+                            <a:schemeClr val="tx1"/>
+                          </a:solidFill>
+                          <a:effectLst/>
+                          <a:latin typeface="+mj-lt"/>
+                          <a:ea typeface="+mn-ea"/>
+                          <a:cs typeface="+mn-cs"/>
+                        </a:rPr>
+                        <a:t>0.799286</a:t>
+                      </a:r>
                       <a:endParaRPr lang="en-US" sz="1400" dirty="0">
                         <a:latin typeface="+mj-lt"/>
                       </a:endParaRPr>
@@ -6010,6 +6077,18 @@
                     <a:bodyPr/>
                     <a:lstStyle/>
                     <a:p>
+                      <a:r>
+                        <a:rPr lang="en-US" sz="1400" b="0" i="0" kern="1200" dirty="0">
+                          <a:solidFill>
+                            <a:schemeClr val="tx1"/>
+                          </a:solidFill>
+                          <a:effectLst/>
+                          <a:latin typeface="+mj-lt"/>
+                          <a:ea typeface="+mn-ea"/>
+                          <a:cs typeface="+mn-cs"/>
+                        </a:rPr>
+                        <a:t>0.800972</a:t>
+                      </a:r>
                       <a:endParaRPr lang="en-US" sz="1400" dirty="0">
                         <a:latin typeface="+mj-lt"/>
                       </a:endParaRPr>
@@ -6059,7 +6138,19 @@
                     <a:bodyPr/>
                     <a:lstStyle/>
                     <a:p>
-                      <a:endParaRPr lang="en-US" sz="1400" dirty="0">
+                      <a:r>
+                        <a:rPr lang="en-US" sz="1400" b="1" i="0" kern="1200" dirty="0">
+                          <a:solidFill>
+                            <a:schemeClr val="tx1"/>
+                          </a:solidFill>
+                          <a:effectLst/>
+                          <a:latin typeface="+mj-lt"/>
+                          <a:ea typeface="+mn-ea"/>
+                          <a:cs typeface="+mn-cs"/>
+                        </a:rPr>
+                        <a:t>0.814675</a:t>
+                      </a:r>
+                      <a:endParaRPr lang="en-US" sz="1400" b="1" dirty="0">
                         <a:latin typeface="+mj-lt"/>
                       </a:endParaRPr>
                     </a:p>
@@ -6112,7 +6203,19 @@
                     <a:bodyPr/>
                     <a:lstStyle/>
                     <a:p>
-                      <a:endParaRPr lang="en-US" sz="1400">
+                      <a:r>
+                        <a:rPr lang="en-US" sz="1400" b="0" i="0" kern="1200" dirty="0">
+                          <a:solidFill>
+                            <a:schemeClr val="tx1"/>
+                          </a:solidFill>
+                          <a:effectLst/>
+                          <a:latin typeface="+mj-lt"/>
+                          <a:ea typeface="+mn-ea"/>
+                          <a:cs typeface="+mn-cs"/>
+                        </a:rPr>
+                        <a:t>0.177585</a:t>
+                      </a:r>
+                      <a:endParaRPr lang="en-US" sz="1400" dirty="0">
                         <a:latin typeface="+mj-lt"/>
                       </a:endParaRPr>
                     </a:p>
@@ -6165,6 +6268,18 @@
                     <a:bodyPr/>
                     <a:lstStyle/>
                     <a:p>
+                      <a:r>
+                        <a:rPr lang="en-US" sz="1400" b="0" i="0" kern="1200" dirty="0">
+                          <a:solidFill>
+                            <a:schemeClr val="tx1"/>
+                          </a:solidFill>
+                          <a:effectLst/>
+                          <a:latin typeface="+mj-lt"/>
+                          <a:ea typeface="+mn-ea"/>
+                          <a:cs typeface="+mn-cs"/>
+                        </a:rPr>
+                        <a:t>-0.180791</a:t>
+                      </a:r>
                       <a:endParaRPr lang="en-US" sz="1400" dirty="0">
                         <a:latin typeface="+mj-lt"/>
                       </a:endParaRPr>
@@ -6218,7 +6333,19 @@
                     <a:bodyPr/>
                     <a:lstStyle/>
                     <a:p>
-                      <a:endParaRPr lang="en-US" sz="1400" dirty="0">
+                      <a:r>
+                        <a:rPr lang="en-US" sz="1400" b="1" i="0" kern="1200" dirty="0">
+                          <a:solidFill>
+                            <a:schemeClr val="tx1"/>
+                          </a:solidFill>
+                          <a:effectLst/>
+                          <a:latin typeface="+mj-lt"/>
+                          <a:ea typeface="+mn-ea"/>
+                          <a:cs typeface="+mn-cs"/>
+                        </a:rPr>
+                        <a:t>0.725683</a:t>
+                      </a:r>
+                      <a:endParaRPr lang="en-US" sz="1400" b="1" dirty="0">
                         <a:latin typeface="+mj-lt"/>
                       </a:endParaRPr>
                     </a:p>
@@ -6271,7 +6398,19 @@
                     <a:bodyPr/>
                     <a:lstStyle/>
                     <a:p>
-                      <a:endParaRPr lang="en-US" sz="1400">
+                      <a:r>
+                        <a:rPr lang="en-US" sz="1400" b="0" i="0" kern="1200" dirty="0">
+                          <a:solidFill>
+                            <a:schemeClr val="tx1"/>
+                          </a:solidFill>
+                          <a:effectLst/>
+                          <a:latin typeface="+mj-lt"/>
+                          <a:ea typeface="+mn-ea"/>
+                          <a:cs typeface="+mn-cs"/>
+                        </a:rPr>
+                        <a:t>-0.683790</a:t>
+                      </a:r>
+                      <a:endParaRPr lang="en-US" sz="1400" dirty="0">
                         <a:latin typeface="+mj-lt"/>
                       </a:endParaRPr>
                     </a:p>
@@ -6324,7 +6463,19 @@
                     <a:bodyPr/>
                     <a:lstStyle/>
                     <a:p>
-                      <a:endParaRPr lang="en-US" sz="1400">
+                      <a:r>
+                        <a:rPr lang="en-US" sz="1400" b="0" i="0" kern="1200" dirty="0">
+                          <a:solidFill>
+                            <a:schemeClr val="tx1"/>
+                          </a:solidFill>
+                          <a:effectLst/>
+                          <a:latin typeface="+mj-lt"/>
+                          <a:ea typeface="+mn-ea"/>
+                          <a:cs typeface="+mn-cs"/>
+                        </a:rPr>
+                        <a:t>0.291740</a:t>
+                      </a:r>
+                      <a:endParaRPr lang="en-US" sz="1400" dirty="0">
                         <a:latin typeface="+mj-lt"/>
                       </a:endParaRPr>
                     </a:p>
@@ -6377,6 +6528,18 @@
                     <a:bodyPr/>
                     <a:lstStyle/>
                     <a:p>
+                      <a:r>
+                        <a:rPr lang="en-US" sz="1400" b="0" i="0" kern="1200" dirty="0">
+                          <a:solidFill>
+                            <a:schemeClr val="tx1"/>
+                          </a:solidFill>
+                          <a:effectLst/>
+                          <a:latin typeface="+mj-lt"/>
+                          <a:ea typeface="+mn-ea"/>
+                          <a:cs typeface="+mn-cs"/>
+                        </a:rPr>
+                        <a:t>0.738533</a:t>
+                      </a:r>
                       <a:endParaRPr lang="en-US" sz="1400" dirty="0">
                         <a:latin typeface="+mj-lt"/>
                       </a:endParaRPr>
@@ -6447,7 +6610,19 @@
                     <a:bodyPr/>
                     <a:lstStyle/>
                     <a:p>
-                      <a:endParaRPr lang="en-US" sz="1400">
+                      <a:r>
+                        <a:rPr lang="en-US" sz="1400" b="1" i="0" kern="1200" dirty="0">
+                          <a:solidFill>
+                            <a:schemeClr val="tx1"/>
+                          </a:solidFill>
+                          <a:effectLst/>
+                          <a:latin typeface="+mj-lt"/>
+                          <a:ea typeface="+mn-ea"/>
+                          <a:cs typeface="+mn-cs"/>
+                        </a:rPr>
+                        <a:t>0.829636</a:t>
+                      </a:r>
+                      <a:endParaRPr lang="en-US" sz="1400" b="1" dirty="0">
                         <a:latin typeface="+mj-lt"/>
                       </a:endParaRPr>
                     </a:p>

</xml_diff>

<commit_message>
updated presentation notebook in progress
</commit_message>
<xml_diff>
--- a/BC_Project3_presentation.pptx
+++ b/BC_Project3_presentation.pptx
@@ -5487,7 +5487,7 @@
         <p:spPr>
           <a:xfrm>
             <a:off x="1073658" y="1725931"/>
-            <a:ext cx="10322052" cy="4857749"/>
+            <a:ext cx="10322052" cy="5052059"/>
           </a:xfrm>
           <a:prstGeom prst="rect">
             <a:avLst/>
@@ -5531,7 +5531,7 @@
             </a:pPr>
             <a:r>
               <a:rPr lang="en-US" sz="3600" dirty="0"/>
-              <a:t>Hypothesis :</a:t>
+              <a:t>Hypothesis : </a:t>
             </a:r>
           </a:p>
           <a:p>
@@ -5563,7 +5563,7 @@
             </a:pPr>
             <a:r>
               <a:rPr lang="en-US" sz="3600" dirty="0"/>
-              <a:t>State hypothesis</a:t>
+              <a:t>Identify dependent and potential predictor variables</a:t>
             </a:r>
           </a:p>
           <a:p>
@@ -5576,7 +5576,7 @@
             </a:pPr>
             <a:r>
               <a:rPr lang="en-US" sz="3600" dirty="0"/>
-              <a:t>Identify dependent and potential predictor variables</a:t>
+              <a:t>Check initial correlation between dependent and potential predictor variables</a:t>
             </a:r>
           </a:p>
           <a:p>
@@ -5589,7 +5589,7 @@
             </a:pPr>
             <a:r>
               <a:rPr lang="en-US" sz="3600" dirty="0"/>
-              <a:t>Check initial correlation between dependent and potential predictor variables</a:t>
+              <a:t>Short-list 3 most correlated predictor variables </a:t>
             </a:r>
           </a:p>
           <a:p>
@@ -5602,7 +5602,7 @@
             </a:pPr>
             <a:r>
               <a:rPr lang="en-US" sz="3600" dirty="0"/>
-              <a:t>Short-list 3 most correlated predictor variables </a:t>
+              <a:t>run uni-variate linear regression model for each predictor variable</a:t>
             </a:r>
           </a:p>
           <a:p>
@@ -5615,15 +5615,7 @@
             </a:pPr>
             <a:r>
               <a:rPr lang="en-US" sz="3600" dirty="0"/>
-              <a:t>run </a:t>
-            </a:r>
-            <a:r>
-              <a:rPr lang="en-US" sz="3600" dirty="0" err="1"/>
-              <a:t>uni</a:t>
-            </a:r>
-            <a:r>
-              <a:rPr lang="en-US" sz="3600" dirty="0"/>
-              <a:t>-variate linear regression model for each predictor variable</a:t>
+              <a:t>Run multi-variate linear regression model for all 3 predictor variable</a:t>
             </a:r>
           </a:p>
           <a:p>
@@ -5636,7 +5628,7 @@
             </a:pPr>
             <a:r>
               <a:rPr lang="en-US" sz="3600" dirty="0"/>
-              <a:t>Run multi-variate linear regression model for all 3 predictor variable</a:t>
+              <a:t>Use the coefficients and y-intercept to predict future outcomes</a:t>
             </a:r>
           </a:p>
           <a:p>
@@ -5647,10 +5639,7 @@
               <a:buFont typeface="Arial" panose="020B0604020202020204" pitchFamily="34" charset="0"/>
               <a:buChar char="•"/>
             </a:pPr>
-            <a:r>
-              <a:rPr lang="en-US" sz="3600" dirty="0"/>
-              <a:t>Use the coefficients and y-intercept to predict future outcomes</a:t>
-            </a:r>
+            <a:endParaRPr lang="en-US" sz="3600" dirty="0"/>
           </a:p>
           <a:p>
             <a:pPr>
@@ -5682,15 +5671,7 @@
             </a:pPr>
             <a:r>
               <a:rPr lang="en-US" sz="3700" dirty="0"/>
-              <a:t>What if the wages continue to rise at their current rate and the </a:t>
-            </a:r>
-            <a:r>
-              <a:rPr lang="en-US" sz="3700" dirty="0" err="1"/>
-              <a:t>morgage</a:t>
-            </a:r>
-            <a:r>
-              <a:rPr lang="en-US" sz="3700" dirty="0"/>
-              <a:t> rate (30 year fixed) holds steady at 4.6 % ...Can you afford to buy a median price home in the future???</a:t>
+              <a:t>What if the wages continue to rise at their current rate and the mortgage rate (30 year fixed) holds steady at 4.6 % ...Can you afford to buy a median price home in the future???</a:t>
             </a:r>
           </a:p>
           <a:p>

</xml_diff>

<commit_message>
created notebook for plot2
</commit_message>
<xml_diff>
--- a/BC_Project3_presentation.pptx
+++ b/BC_Project3_presentation.pptx
@@ -4968,6 +4968,21 @@
               <a:rPr lang="en-US" sz="2800" dirty="0"/>
               <a:t>San Francisco</a:t>
             </a:r>
+          </a:p>
+          <a:p>
+            <a:pPr marL="457200" indent="-457200">
+              <a:buFont typeface="Arial" panose="020B0604020202020204" pitchFamily="34" charset="0"/>
+              <a:buChar char="•"/>
+            </a:pPr>
+            <a:r>
+              <a:rPr lang="en-US" sz="2800" dirty="0"/>
+              <a:t>Santa </a:t>
+            </a:r>
+            <a:r>
+              <a:rPr lang="en-US" sz="2800" dirty="0" err="1"/>
+              <a:t>clara</a:t>
+            </a:r>
+            <a:endParaRPr lang="en-US" sz="2800" dirty="0"/>
           </a:p>
           <a:p>
             <a:pPr marL="457200" indent="-457200">

</xml_diff>